<commit_message>
You can contact me at...
</commit_message>
<xml_diff>
--- a/Pip pitch.pptx
+++ b/Pip pitch.pptx
@@ -104,6 +104,11 @@
       </a:defRPr>
     </a:lvl9pPr>
   </p:defaultTextStyle>
+  <p:extLst>
+    <p:ext uri="{EFAFB233-063F-42B5-8137-9DF3F51BA10A}">
+      <p15:sldGuideLst xmlns:p15="http://schemas.microsoft.com/office/powerpoint/2012/main"/>
+    </p:ext>
+  </p:extLst>
 </p:presentation>
 </file>
 
@@ -238,7 +243,7 @@
           <a:p>
             <a:fld id="{41B38B81-B549-47D6-B57B-59F8B54DD21A}" type="datetimeFigureOut">
               <a:rPr lang="fi-FI" smtClean="0"/>
-              <a:t>31.3.2016</a:t>
+              <a:t>8.4.2016</a:t>
             </a:fld>
             <a:endParaRPr lang="fi-FI"/>
           </a:p>
@@ -408,7 +413,7 @@
           <a:p>
             <a:fld id="{41B38B81-B549-47D6-B57B-59F8B54DD21A}" type="datetimeFigureOut">
               <a:rPr lang="fi-FI" smtClean="0"/>
-              <a:t>31.3.2016</a:t>
+              <a:t>8.4.2016</a:t>
             </a:fld>
             <a:endParaRPr lang="fi-FI"/>
           </a:p>
@@ -588,7 +593,7 @@
           <a:p>
             <a:fld id="{41B38B81-B549-47D6-B57B-59F8B54DD21A}" type="datetimeFigureOut">
               <a:rPr lang="fi-FI" smtClean="0"/>
-              <a:t>31.3.2016</a:t>
+              <a:t>8.4.2016</a:t>
             </a:fld>
             <a:endParaRPr lang="fi-FI"/>
           </a:p>
@@ -758,7 +763,7 @@
           <a:p>
             <a:fld id="{41B38B81-B549-47D6-B57B-59F8B54DD21A}" type="datetimeFigureOut">
               <a:rPr lang="fi-FI" smtClean="0"/>
-              <a:t>31.3.2016</a:t>
+              <a:t>8.4.2016</a:t>
             </a:fld>
             <a:endParaRPr lang="fi-FI"/>
           </a:p>
@@ -1004,7 +1009,7 @@
           <a:p>
             <a:fld id="{41B38B81-B549-47D6-B57B-59F8B54DD21A}" type="datetimeFigureOut">
               <a:rPr lang="fi-FI" smtClean="0"/>
-              <a:t>31.3.2016</a:t>
+              <a:t>8.4.2016</a:t>
             </a:fld>
             <a:endParaRPr lang="fi-FI"/>
           </a:p>
@@ -1236,7 +1241,7 @@
           <a:p>
             <a:fld id="{41B38B81-B549-47D6-B57B-59F8B54DD21A}" type="datetimeFigureOut">
               <a:rPr lang="fi-FI" smtClean="0"/>
-              <a:t>31.3.2016</a:t>
+              <a:t>8.4.2016</a:t>
             </a:fld>
             <a:endParaRPr lang="fi-FI"/>
           </a:p>
@@ -1603,7 +1608,7 @@
           <a:p>
             <a:fld id="{41B38B81-B549-47D6-B57B-59F8B54DD21A}" type="datetimeFigureOut">
               <a:rPr lang="fi-FI" smtClean="0"/>
-              <a:t>31.3.2016</a:t>
+              <a:t>8.4.2016</a:t>
             </a:fld>
             <a:endParaRPr lang="fi-FI"/>
           </a:p>
@@ -1721,7 +1726,7 @@
           <a:p>
             <a:fld id="{41B38B81-B549-47D6-B57B-59F8B54DD21A}" type="datetimeFigureOut">
               <a:rPr lang="fi-FI" smtClean="0"/>
-              <a:t>31.3.2016</a:t>
+              <a:t>8.4.2016</a:t>
             </a:fld>
             <a:endParaRPr lang="fi-FI"/>
           </a:p>
@@ -1816,7 +1821,7 @@
           <a:p>
             <a:fld id="{41B38B81-B549-47D6-B57B-59F8B54DD21A}" type="datetimeFigureOut">
               <a:rPr lang="fi-FI" smtClean="0"/>
-              <a:t>31.3.2016</a:t>
+              <a:t>8.4.2016</a:t>
             </a:fld>
             <a:endParaRPr lang="fi-FI"/>
           </a:p>
@@ -2093,7 +2098,7 @@
           <a:p>
             <a:fld id="{41B38B81-B549-47D6-B57B-59F8B54DD21A}" type="datetimeFigureOut">
               <a:rPr lang="fi-FI" smtClean="0"/>
-              <a:t>31.3.2016</a:t>
+              <a:t>8.4.2016</a:t>
             </a:fld>
             <a:endParaRPr lang="fi-FI"/>
           </a:p>
@@ -2346,7 +2351,7 @@
           <a:p>
             <a:fld id="{41B38B81-B549-47D6-B57B-59F8B54DD21A}" type="datetimeFigureOut">
               <a:rPr lang="fi-FI" smtClean="0"/>
-              <a:t>31.3.2016</a:t>
+              <a:t>8.4.2016</a:t>
             </a:fld>
             <a:endParaRPr lang="fi-FI"/>
           </a:p>
@@ -2559,7 +2564,7 @@
           <a:p>
             <a:fld id="{41B38B81-B549-47D6-B57B-59F8B54DD21A}" type="datetimeFigureOut">
               <a:rPr lang="fi-FI" smtClean="0"/>
-              <a:t>31.3.2016</a:t>
+              <a:t>8.4.2016</a:t>
             </a:fld>
             <a:endParaRPr lang="fi-FI"/>
           </a:p>
@@ -3945,7 +3950,7 @@
                   <a:srgbClr val="FFFF00"/>
                 </a:solidFill>
               </a:rPr>
-              <a:t>GabeN</a:t>
+              <a:t>GaybeN</a:t>
             </a:r>
             <a:endParaRPr lang="fi-FI" dirty="0" smtClean="0">
               <a:solidFill>

</xml_diff>

<commit_message>
The bitch is now perfect
</commit_message>
<xml_diff>
--- a/Pip pitch.pptx
+++ b/Pip pitch.pptx
@@ -243,7 +243,7 @@
           <a:p>
             <a:fld id="{41B38B81-B549-47D6-B57B-59F8B54DD21A}" type="datetimeFigureOut">
               <a:rPr lang="fi-FI" smtClean="0"/>
-              <a:t>8.4.2016</a:t>
+              <a:t>12.4.2016</a:t>
             </a:fld>
             <a:endParaRPr lang="fi-FI"/>
           </a:p>
@@ -413,7 +413,7 @@
           <a:p>
             <a:fld id="{41B38B81-B549-47D6-B57B-59F8B54DD21A}" type="datetimeFigureOut">
               <a:rPr lang="fi-FI" smtClean="0"/>
-              <a:t>8.4.2016</a:t>
+              <a:t>12.4.2016</a:t>
             </a:fld>
             <a:endParaRPr lang="fi-FI"/>
           </a:p>
@@ -593,7 +593,7 @@
           <a:p>
             <a:fld id="{41B38B81-B549-47D6-B57B-59F8B54DD21A}" type="datetimeFigureOut">
               <a:rPr lang="fi-FI" smtClean="0"/>
-              <a:t>8.4.2016</a:t>
+              <a:t>12.4.2016</a:t>
             </a:fld>
             <a:endParaRPr lang="fi-FI"/>
           </a:p>
@@ -763,7 +763,7 @@
           <a:p>
             <a:fld id="{41B38B81-B549-47D6-B57B-59F8B54DD21A}" type="datetimeFigureOut">
               <a:rPr lang="fi-FI" smtClean="0"/>
-              <a:t>8.4.2016</a:t>
+              <a:t>12.4.2016</a:t>
             </a:fld>
             <a:endParaRPr lang="fi-FI"/>
           </a:p>
@@ -1009,7 +1009,7 @@
           <a:p>
             <a:fld id="{41B38B81-B549-47D6-B57B-59F8B54DD21A}" type="datetimeFigureOut">
               <a:rPr lang="fi-FI" smtClean="0"/>
-              <a:t>8.4.2016</a:t>
+              <a:t>12.4.2016</a:t>
             </a:fld>
             <a:endParaRPr lang="fi-FI"/>
           </a:p>
@@ -1241,7 +1241,7 @@
           <a:p>
             <a:fld id="{41B38B81-B549-47D6-B57B-59F8B54DD21A}" type="datetimeFigureOut">
               <a:rPr lang="fi-FI" smtClean="0"/>
-              <a:t>8.4.2016</a:t>
+              <a:t>12.4.2016</a:t>
             </a:fld>
             <a:endParaRPr lang="fi-FI"/>
           </a:p>
@@ -1608,7 +1608,7 @@
           <a:p>
             <a:fld id="{41B38B81-B549-47D6-B57B-59F8B54DD21A}" type="datetimeFigureOut">
               <a:rPr lang="fi-FI" smtClean="0"/>
-              <a:t>8.4.2016</a:t>
+              <a:t>12.4.2016</a:t>
             </a:fld>
             <a:endParaRPr lang="fi-FI"/>
           </a:p>
@@ -1726,7 +1726,7 @@
           <a:p>
             <a:fld id="{41B38B81-B549-47D6-B57B-59F8B54DD21A}" type="datetimeFigureOut">
               <a:rPr lang="fi-FI" smtClean="0"/>
-              <a:t>8.4.2016</a:t>
+              <a:t>12.4.2016</a:t>
             </a:fld>
             <a:endParaRPr lang="fi-FI"/>
           </a:p>
@@ -1821,7 +1821,7 @@
           <a:p>
             <a:fld id="{41B38B81-B549-47D6-B57B-59F8B54DD21A}" type="datetimeFigureOut">
               <a:rPr lang="fi-FI" smtClean="0"/>
-              <a:t>8.4.2016</a:t>
+              <a:t>12.4.2016</a:t>
             </a:fld>
             <a:endParaRPr lang="fi-FI"/>
           </a:p>
@@ -2098,7 +2098,7 @@
           <a:p>
             <a:fld id="{41B38B81-B549-47D6-B57B-59F8B54DD21A}" type="datetimeFigureOut">
               <a:rPr lang="fi-FI" smtClean="0"/>
-              <a:t>8.4.2016</a:t>
+              <a:t>12.4.2016</a:t>
             </a:fld>
             <a:endParaRPr lang="fi-FI"/>
           </a:p>
@@ -2351,7 +2351,7 @@
           <a:p>
             <a:fld id="{41B38B81-B549-47D6-B57B-59F8B54DD21A}" type="datetimeFigureOut">
               <a:rPr lang="fi-FI" smtClean="0"/>
-              <a:t>8.4.2016</a:t>
+              <a:t>12.4.2016</a:t>
             </a:fld>
             <a:endParaRPr lang="fi-FI"/>
           </a:p>
@@ -2564,7 +2564,7 @@
           <a:p>
             <a:fld id="{41B38B81-B549-47D6-B57B-59F8B54DD21A}" type="datetimeFigureOut">
               <a:rPr lang="fi-FI" smtClean="0"/>
-              <a:t>8.4.2016</a:t>
+              <a:t>12.4.2016</a:t>
             </a:fld>
             <a:endParaRPr lang="fi-FI"/>
           </a:p>
@@ -3086,7 +3086,7 @@
         <p:spPr/>
         <p:txBody>
           <a:bodyPr>
-            <a:normAutofit fontScale="92500" lnSpcReduction="20000"/>
+            <a:normAutofit fontScale="85000" lnSpcReduction="10000"/>
           </a:bodyPr>
           <a:lstStyle/>
           <a:p>
@@ -3095,6 +3095,7 @@
                 <a:solidFill>
                   <a:srgbClr val="FFFF00"/>
                 </a:solidFill>
+                <a:latin typeface="Comic Sans MS" panose="030F0702030302020204" pitchFamily="66" charset="0"/>
               </a:rPr>
               <a:t>P.I.P. : </a:t>
             </a:r>
@@ -3103,6 +3104,7 @@
                 <a:solidFill>
                   <a:srgbClr val="FFFF00"/>
                 </a:solidFill>
+                <a:latin typeface="Comic Sans MS" panose="030F0702030302020204" pitchFamily="66" charset="0"/>
               </a:rPr>
               <a:t>Playable</a:t>
             </a:r>
@@ -3111,6 +3113,7 @@
                 <a:solidFill>
                   <a:srgbClr val="FFFF00"/>
                 </a:solidFill>
+                <a:latin typeface="Comic Sans MS" panose="030F0702030302020204" pitchFamily="66" charset="0"/>
               </a:rPr>
               <a:t> </a:t>
             </a:r>
@@ -3119,6 +3122,7 @@
                 <a:solidFill>
                   <a:srgbClr val="FFFF00"/>
                 </a:solidFill>
+                <a:latin typeface="Comic Sans MS" panose="030F0702030302020204" pitchFamily="66" charset="0"/>
               </a:rPr>
               <a:t>Intergalactic</a:t>
             </a:r>
@@ -3127,6 +3131,7 @@
                 <a:solidFill>
                   <a:srgbClr val="FFFF00"/>
                 </a:solidFill>
+                <a:latin typeface="Comic Sans MS" panose="030F0702030302020204" pitchFamily="66" charset="0"/>
               </a:rPr>
               <a:t> </a:t>
             </a:r>
@@ -3135,6 +3140,7 @@
                 <a:solidFill>
                   <a:srgbClr val="FFFF00"/>
                 </a:solidFill>
+                <a:latin typeface="Comic Sans MS" panose="030F0702030302020204" pitchFamily="66" charset="0"/>
               </a:rPr>
               <a:t>Phallus</a:t>
             </a:r>
@@ -3142,6 +3148,7 @@
               <a:solidFill>
                 <a:srgbClr val="FFFF00"/>
               </a:solidFill>
+              <a:latin typeface="Comic Sans MS" panose="030F0702030302020204" pitchFamily="66" charset="0"/>
             </a:endParaRPr>
           </a:p>
           <a:p>
@@ -3150,6 +3157,7 @@
                 <a:solidFill>
                   <a:srgbClr val="FFFF00"/>
                 </a:solidFill>
+                <a:latin typeface="Comic Sans MS" panose="030F0702030302020204" pitchFamily="66" charset="0"/>
               </a:rPr>
               <a:t>A </a:t>
             </a:r>
@@ -3158,6 +3166,7 @@
                 <a:solidFill>
                   <a:srgbClr val="FFFF00"/>
                 </a:solidFill>
+                <a:latin typeface="Comic Sans MS" panose="030F0702030302020204" pitchFamily="66" charset="0"/>
               </a:rPr>
               <a:t>shoot-em-up</a:t>
             </a:r>
@@ -3166,6 +3175,7 @@
                 <a:solidFill>
                   <a:srgbClr val="FFFF00"/>
                 </a:solidFill>
+                <a:latin typeface="Comic Sans MS" panose="030F0702030302020204" pitchFamily="66" charset="0"/>
               </a:rPr>
               <a:t> </a:t>
             </a:r>
@@ -3174,6 +3184,7 @@
                 <a:solidFill>
                   <a:srgbClr val="FFFF00"/>
                 </a:solidFill>
+                <a:latin typeface="Comic Sans MS" panose="030F0702030302020204" pitchFamily="66" charset="0"/>
               </a:rPr>
               <a:t>game</a:t>
             </a:r>
@@ -3182,6 +3193,7 @@
                 <a:solidFill>
                   <a:srgbClr val="FFFF00"/>
                 </a:solidFill>
+                <a:latin typeface="Comic Sans MS" panose="030F0702030302020204" pitchFamily="66" charset="0"/>
               </a:rPr>
               <a:t> </a:t>
             </a:r>
@@ -3190,6 +3202,7 @@
                 <a:solidFill>
                   <a:srgbClr val="FFFF00"/>
                 </a:solidFill>
+                <a:latin typeface="Comic Sans MS" panose="030F0702030302020204" pitchFamily="66" charset="0"/>
               </a:rPr>
               <a:t>with</a:t>
             </a:r>
@@ -3198,6 +3211,7 @@
                 <a:solidFill>
                   <a:srgbClr val="FFFF00"/>
                 </a:solidFill>
+                <a:latin typeface="Comic Sans MS" panose="030F0702030302020204" pitchFamily="66" charset="0"/>
               </a:rPr>
               <a:t> </a:t>
             </a:r>
@@ -3206,6 +3220,7 @@
                 <a:solidFill>
                   <a:srgbClr val="FFFF00"/>
                 </a:solidFill>
+                <a:latin typeface="Comic Sans MS" panose="030F0702030302020204" pitchFamily="66" charset="0"/>
               </a:rPr>
               <a:t>cuhrayzee</a:t>
             </a:r>
@@ -3214,6 +3229,7 @@
                 <a:solidFill>
                   <a:srgbClr val="FFFF00"/>
                 </a:solidFill>
+                <a:latin typeface="Comic Sans MS" panose="030F0702030302020204" pitchFamily="66" charset="0"/>
               </a:rPr>
               <a:t> </a:t>
             </a:r>
@@ -3222,6 +3238,7 @@
                 <a:solidFill>
                   <a:srgbClr val="FFFF00"/>
                 </a:solidFill>
+                <a:latin typeface="Comic Sans MS" panose="030F0702030302020204" pitchFamily="66" charset="0"/>
               </a:rPr>
               <a:t>visuals</a:t>
             </a:r>
@@ -3230,6 +3247,7 @@
                 <a:solidFill>
                   <a:srgbClr val="FFFF00"/>
                 </a:solidFill>
+                <a:latin typeface="Comic Sans MS" panose="030F0702030302020204" pitchFamily="66" charset="0"/>
               </a:rPr>
               <a:t> and a </a:t>
             </a:r>
@@ -3238,6 +3256,7 @@
                 <a:solidFill>
                   <a:srgbClr val="FFFF00"/>
                 </a:solidFill>
+                <a:latin typeface="Comic Sans MS" panose="030F0702030302020204" pitchFamily="66" charset="0"/>
               </a:rPr>
               <a:t>touching</a:t>
             </a:r>
@@ -3246,6 +3265,7 @@
                 <a:solidFill>
                   <a:srgbClr val="FFFF00"/>
                 </a:solidFill>
+                <a:latin typeface="Comic Sans MS" panose="030F0702030302020204" pitchFamily="66" charset="0"/>
               </a:rPr>
               <a:t> soundtrack</a:t>
             </a:r>
@@ -3256,6 +3276,7 @@
                 <a:solidFill>
                   <a:srgbClr val="FFFF00"/>
                 </a:solidFill>
+                <a:latin typeface="Comic Sans MS" panose="030F0702030302020204" pitchFamily="66" charset="0"/>
               </a:rPr>
               <a:t>A </a:t>
             </a:r>
@@ -3264,6 +3285,7 @@
                 <a:solidFill>
                   <a:srgbClr val="FFFF00"/>
                 </a:solidFill>
+                <a:latin typeface="Comic Sans MS" panose="030F0702030302020204" pitchFamily="66" charset="0"/>
               </a:rPr>
               <a:t>tragic</a:t>
             </a:r>
@@ -3272,6 +3294,7 @@
                 <a:solidFill>
                   <a:srgbClr val="FFFF00"/>
                 </a:solidFill>
+                <a:latin typeface="Comic Sans MS" panose="030F0702030302020204" pitchFamily="66" charset="0"/>
               </a:rPr>
               <a:t> </a:t>
             </a:r>
@@ -3280,6 +3303,7 @@
                 <a:solidFill>
                   <a:srgbClr val="FFFF00"/>
                 </a:solidFill>
+                <a:latin typeface="Comic Sans MS" panose="030F0702030302020204" pitchFamily="66" charset="0"/>
               </a:rPr>
               <a:t>story</a:t>
             </a:r>
@@ -3288,6 +3312,7 @@
                 <a:solidFill>
                   <a:srgbClr val="FFFF00"/>
                 </a:solidFill>
+                <a:latin typeface="Comic Sans MS" panose="030F0702030302020204" pitchFamily="66" charset="0"/>
               </a:rPr>
               <a:t> of a </a:t>
             </a:r>
@@ -3296,6 +3321,7 @@
                 <a:solidFill>
                   <a:srgbClr val="FFFF00"/>
                 </a:solidFill>
+                <a:latin typeface="Comic Sans MS" panose="030F0702030302020204" pitchFamily="66" charset="0"/>
               </a:rPr>
               <a:t>rocketman</a:t>
             </a:r>
@@ -3304,6 +3330,7 @@
                 <a:solidFill>
                   <a:srgbClr val="FFFF00"/>
                 </a:solidFill>
+                <a:latin typeface="Comic Sans MS" panose="030F0702030302020204" pitchFamily="66" charset="0"/>
               </a:rPr>
               <a:t> </a:t>
             </a:r>
@@ -3312,6 +3339,7 @@
                 <a:solidFill>
                   <a:srgbClr val="FFFF00"/>
                 </a:solidFill>
+                <a:latin typeface="Comic Sans MS" panose="030F0702030302020204" pitchFamily="66" charset="0"/>
               </a:rPr>
               <a:t>facing</a:t>
             </a:r>
@@ -3320,6 +3348,7 @@
                 <a:solidFill>
                   <a:srgbClr val="FFFF00"/>
                 </a:solidFill>
+                <a:latin typeface="Comic Sans MS" panose="030F0702030302020204" pitchFamily="66" charset="0"/>
               </a:rPr>
               <a:t> </a:t>
             </a:r>
@@ -3328,6 +3357,7 @@
                 <a:solidFill>
                   <a:srgbClr val="FFFF00"/>
                 </a:solidFill>
+                <a:latin typeface="Comic Sans MS" panose="030F0702030302020204" pitchFamily="66" charset="0"/>
               </a:rPr>
               <a:t>his</a:t>
             </a:r>
@@ -3336,6 +3366,7 @@
                 <a:solidFill>
                   <a:srgbClr val="FFFF00"/>
                 </a:solidFill>
+                <a:latin typeface="Comic Sans MS" panose="030F0702030302020204" pitchFamily="66" charset="0"/>
               </a:rPr>
               <a:t> </a:t>
             </a:r>
@@ -3344,6 +3375,7 @@
                 <a:solidFill>
                   <a:srgbClr val="FFFF00"/>
                 </a:solidFill>
+                <a:latin typeface="Comic Sans MS" panose="030F0702030302020204" pitchFamily="66" charset="0"/>
               </a:rPr>
               <a:t>inner</a:t>
             </a:r>
@@ -3352,6 +3384,7 @@
                 <a:solidFill>
                   <a:srgbClr val="FFFF00"/>
                 </a:solidFill>
+                <a:latin typeface="Comic Sans MS" panose="030F0702030302020204" pitchFamily="66" charset="0"/>
               </a:rPr>
               <a:t> and </a:t>
             </a:r>
@@ -3360,6 +3393,7 @@
                 <a:solidFill>
                   <a:srgbClr val="FFFF00"/>
                 </a:solidFill>
+                <a:latin typeface="Comic Sans MS" panose="030F0702030302020204" pitchFamily="66" charset="0"/>
               </a:rPr>
               <a:t>outer</a:t>
             </a:r>
@@ -3368,6 +3402,7 @@
                 <a:solidFill>
                   <a:srgbClr val="FFFF00"/>
                 </a:solidFill>
+                <a:latin typeface="Comic Sans MS" panose="030F0702030302020204" pitchFamily="66" charset="0"/>
               </a:rPr>
               <a:t> </a:t>
             </a:r>
@@ -3376,6 +3411,7 @@
                 <a:solidFill>
                   <a:srgbClr val="FFFF00"/>
                 </a:solidFill>
+                <a:latin typeface="Comic Sans MS" panose="030F0702030302020204" pitchFamily="66" charset="0"/>
               </a:rPr>
               <a:t>demons</a:t>
             </a:r>
@@ -3383,6 +3419,7 @@
               <a:solidFill>
                 <a:srgbClr val="FFFF00"/>
               </a:solidFill>
+              <a:latin typeface="Comic Sans MS" panose="030F0702030302020204" pitchFamily="66" charset="0"/>
             </a:endParaRPr>
           </a:p>
           <a:p>
@@ -3391,6 +3428,7 @@
                 <a:solidFill>
                   <a:srgbClr val="FFFF00"/>
                 </a:solidFill>
+                <a:latin typeface="Comic Sans MS" panose="030F0702030302020204" pitchFamily="66" charset="0"/>
               </a:rPr>
               <a:t>Fun and </a:t>
             </a:r>
@@ -3399,6 +3437,7 @@
                 <a:solidFill>
                   <a:srgbClr val="FFFF00"/>
                 </a:solidFill>
+                <a:latin typeface="Comic Sans MS" panose="030F0702030302020204" pitchFamily="66" charset="0"/>
               </a:rPr>
               <a:t>challenging</a:t>
             </a:r>
@@ -3407,6 +3446,7 @@
                 <a:solidFill>
                   <a:srgbClr val="FFFF00"/>
                 </a:solidFill>
+                <a:latin typeface="Comic Sans MS" panose="030F0702030302020204" pitchFamily="66" charset="0"/>
               </a:rPr>
               <a:t> </a:t>
             </a:r>
@@ -3415,6 +3455,7 @@
                 <a:solidFill>
                   <a:srgbClr val="FFFF00"/>
                 </a:solidFill>
+                <a:latin typeface="Comic Sans MS" panose="030F0702030302020204" pitchFamily="66" charset="0"/>
               </a:rPr>
               <a:t>mechanics</a:t>
             </a:r>
@@ -3423,6 +3464,7 @@
                 <a:solidFill>
                   <a:srgbClr val="FFFF00"/>
                 </a:solidFill>
+                <a:latin typeface="Comic Sans MS" panose="030F0702030302020204" pitchFamily="66" charset="0"/>
               </a:rPr>
               <a:t> </a:t>
             </a:r>
@@ -3431,6 +3473,7 @@
                 <a:solidFill>
                   <a:srgbClr val="FFFF00"/>
                 </a:solidFill>
+                <a:latin typeface="Comic Sans MS" panose="030F0702030302020204" pitchFamily="66" charset="0"/>
               </a:rPr>
               <a:t>that</a:t>
             </a:r>
@@ -3439,6 +3482,7 @@
                 <a:solidFill>
                   <a:srgbClr val="FFFF00"/>
                 </a:solidFill>
+                <a:latin typeface="Comic Sans MS" panose="030F0702030302020204" pitchFamily="66" charset="0"/>
               </a:rPr>
               <a:t> </a:t>
             </a:r>
@@ -3447,6 +3491,7 @@
                 <a:solidFill>
                   <a:srgbClr val="FFFF00"/>
                 </a:solidFill>
+                <a:latin typeface="Comic Sans MS" panose="030F0702030302020204" pitchFamily="66" charset="0"/>
               </a:rPr>
               <a:t>make</a:t>
             </a:r>
@@ -3455,6 +3500,7 @@
                 <a:solidFill>
                   <a:srgbClr val="FFFF00"/>
                 </a:solidFill>
+                <a:latin typeface="Comic Sans MS" panose="030F0702030302020204" pitchFamily="66" charset="0"/>
               </a:rPr>
               <a:t> </a:t>
             </a:r>
@@ -3463,6 +3509,7 @@
                 <a:solidFill>
                   <a:srgbClr val="FFFF00"/>
                 </a:solidFill>
+                <a:latin typeface="Comic Sans MS" panose="030F0702030302020204" pitchFamily="66" charset="0"/>
               </a:rPr>
               <a:t>the</a:t>
             </a:r>
@@ -3471,6 +3518,7 @@
                 <a:solidFill>
                   <a:srgbClr val="FFFF00"/>
                 </a:solidFill>
+                <a:latin typeface="Comic Sans MS" panose="030F0702030302020204" pitchFamily="66" charset="0"/>
               </a:rPr>
               <a:t> </a:t>
             </a:r>
@@ -3479,6 +3527,7 @@
                 <a:solidFill>
                   <a:srgbClr val="FFFF00"/>
                 </a:solidFill>
+                <a:latin typeface="Comic Sans MS" panose="030F0702030302020204" pitchFamily="66" charset="0"/>
               </a:rPr>
               <a:t>player</a:t>
             </a:r>
@@ -3487,6 +3536,7 @@
                 <a:solidFill>
                   <a:srgbClr val="FFFF00"/>
                 </a:solidFill>
+                <a:latin typeface="Comic Sans MS" panose="030F0702030302020204" pitchFamily="66" charset="0"/>
               </a:rPr>
               <a:t> </a:t>
             </a:r>
@@ -3495,6 +3545,7 @@
                 <a:solidFill>
                   <a:srgbClr val="FFFF00"/>
                 </a:solidFill>
+                <a:latin typeface="Comic Sans MS" panose="030F0702030302020204" pitchFamily="66" charset="0"/>
               </a:rPr>
               <a:t>question</a:t>
             </a:r>
@@ -3503,6 +3554,7 @@
                 <a:solidFill>
                   <a:srgbClr val="FFFF00"/>
                 </a:solidFill>
+                <a:latin typeface="Comic Sans MS" panose="030F0702030302020204" pitchFamily="66" charset="0"/>
               </a:rPr>
               <a:t> </a:t>
             </a:r>
@@ -3511,6 +3563,7 @@
                 <a:solidFill>
                   <a:srgbClr val="FFFF00"/>
                 </a:solidFill>
+                <a:latin typeface="Comic Sans MS" panose="030F0702030302020204" pitchFamily="66" charset="0"/>
               </a:rPr>
               <a:t>their</a:t>
             </a:r>
@@ -3519,6 +3572,7 @@
                 <a:solidFill>
                   <a:srgbClr val="FFFF00"/>
                 </a:solidFill>
+                <a:latin typeface="Comic Sans MS" panose="030F0702030302020204" pitchFamily="66" charset="0"/>
               </a:rPr>
               <a:t> </a:t>
             </a:r>
@@ -3527,6 +3581,7 @@
                 <a:solidFill>
                   <a:srgbClr val="FFFF00"/>
                 </a:solidFill>
+                <a:latin typeface="Comic Sans MS" panose="030F0702030302020204" pitchFamily="66" charset="0"/>
               </a:rPr>
               <a:t>skills</a:t>
             </a:r>
@@ -3535,6 +3590,7 @@
                 <a:solidFill>
                   <a:srgbClr val="FFFF00"/>
                 </a:solidFill>
+                <a:latin typeface="Comic Sans MS" panose="030F0702030302020204" pitchFamily="66" charset="0"/>
               </a:rPr>
               <a:t> (and </a:t>
             </a:r>
@@ -3543,6 +3599,7 @@
                 <a:solidFill>
                   <a:srgbClr val="FFFF00"/>
                 </a:solidFill>
+                <a:latin typeface="Comic Sans MS" panose="030F0702030302020204" pitchFamily="66" charset="0"/>
               </a:rPr>
               <a:t>sanity</a:t>
             </a:r>
@@ -3551,6 +3608,7 @@
                 <a:solidFill>
                   <a:srgbClr val="FFFF00"/>
                 </a:solidFill>
+                <a:latin typeface="Comic Sans MS" panose="030F0702030302020204" pitchFamily="66" charset="0"/>
               </a:rPr>
               <a:t>)</a:t>
             </a:r>
@@ -3561,6 +3619,7 @@
                 <a:solidFill>
                   <a:srgbClr val="FFFF00"/>
                 </a:solidFill>
+                <a:latin typeface="Comic Sans MS" panose="030F0702030302020204" pitchFamily="66" charset="0"/>
               </a:rPr>
               <a:t>Silky</a:t>
             </a:r>
@@ -3569,6 +3628,7 @@
                 <a:solidFill>
                   <a:srgbClr val="FFFF00"/>
                 </a:solidFill>
+                <a:latin typeface="Comic Sans MS" panose="030F0702030302020204" pitchFamily="66" charset="0"/>
               </a:rPr>
               <a:t> </a:t>
             </a:r>
@@ -3577,6 +3637,7 @@
                 <a:solidFill>
                   <a:srgbClr val="FFFF00"/>
                 </a:solidFill>
+                <a:latin typeface="Comic Sans MS" panose="030F0702030302020204" pitchFamily="66" charset="0"/>
               </a:rPr>
               <a:t>smooth</a:t>
             </a:r>
@@ -3585,6 +3646,7 @@
                 <a:solidFill>
                   <a:srgbClr val="FFFF00"/>
                 </a:solidFill>
+                <a:latin typeface="Comic Sans MS" panose="030F0702030302020204" pitchFamily="66" charset="0"/>
               </a:rPr>
               <a:t> 60fps 1080p </a:t>
             </a:r>
@@ -3593,6 +3655,7 @@
                 <a:solidFill>
                   <a:srgbClr val="FFFF00"/>
                 </a:solidFill>
+                <a:latin typeface="Comic Sans MS" panose="030F0702030302020204" pitchFamily="66" charset="0"/>
               </a:rPr>
               <a:t>next-gen</a:t>
             </a:r>
@@ -3601,6 +3664,7 @@
                 <a:solidFill>
                   <a:srgbClr val="FFFF00"/>
                 </a:solidFill>
+                <a:latin typeface="Comic Sans MS" panose="030F0702030302020204" pitchFamily="66" charset="0"/>
               </a:rPr>
               <a:t> </a:t>
             </a:r>
@@ -3609,6 +3673,7 @@
                 <a:solidFill>
                   <a:srgbClr val="FFFF00"/>
                 </a:solidFill>
+                <a:latin typeface="Comic Sans MS" panose="030F0702030302020204" pitchFamily="66" charset="0"/>
               </a:rPr>
               <a:t>cinematic</a:t>
             </a:r>
@@ -3617,6 +3682,7 @@
                 <a:solidFill>
                   <a:srgbClr val="FFFF00"/>
                 </a:solidFill>
+                <a:latin typeface="Comic Sans MS" panose="030F0702030302020204" pitchFamily="66" charset="0"/>
               </a:rPr>
               <a:t> </a:t>
             </a:r>
@@ -3625,6 +3691,7 @@
                 <a:solidFill>
                   <a:srgbClr val="FFFF00"/>
                 </a:solidFill>
+                <a:latin typeface="Comic Sans MS" panose="030F0702030302020204" pitchFamily="66" charset="0"/>
               </a:rPr>
               <a:t>graffix</a:t>
             </a:r>
@@ -3632,6 +3699,7 @@
               <a:solidFill>
                 <a:srgbClr val="FFFF00"/>
               </a:solidFill>
+              <a:latin typeface="Comic Sans MS" panose="030F0702030302020204" pitchFamily="66" charset="0"/>
             </a:endParaRPr>
           </a:p>
           <a:p>
@@ -3640,6 +3708,7 @@
                 <a:solidFill>
                   <a:srgbClr val="FFFF00"/>
                 </a:solidFill>
+                <a:latin typeface="Comic Sans MS" panose="030F0702030302020204" pitchFamily="66" charset="0"/>
               </a:rPr>
               <a:t>Introducing</a:t>
             </a:r>
@@ -3648,6 +3717,7 @@
                 <a:solidFill>
                   <a:srgbClr val="FFFF00"/>
                 </a:solidFill>
+                <a:latin typeface="Comic Sans MS" panose="030F0702030302020204" pitchFamily="66" charset="0"/>
               </a:rPr>
               <a:t> for </a:t>
             </a:r>
@@ -3656,6 +3726,7 @@
                 <a:solidFill>
                   <a:srgbClr val="FFFF00"/>
                 </a:solidFill>
+                <a:latin typeface="Comic Sans MS" panose="030F0702030302020204" pitchFamily="66" charset="0"/>
               </a:rPr>
               <a:t>the</a:t>
             </a:r>
@@ -3664,6 +3735,7 @@
                 <a:solidFill>
                   <a:srgbClr val="FFFF00"/>
                 </a:solidFill>
+                <a:latin typeface="Comic Sans MS" panose="030F0702030302020204" pitchFamily="66" charset="0"/>
               </a:rPr>
               <a:t> </a:t>
             </a:r>
@@ -3672,6 +3744,7 @@
                 <a:solidFill>
                   <a:srgbClr val="FFFF00"/>
                 </a:solidFill>
+                <a:latin typeface="Comic Sans MS" panose="030F0702030302020204" pitchFamily="66" charset="0"/>
               </a:rPr>
               <a:t>first</a:t>
             </a:r>
@@ -3680,6 +3753,7 @@
                 <a:solidFill>
                   <a:srgbClr val="FFFF00"/>
                 </a:solidFill>
+                <a:latin typeface="Comic Sans MS" panose="030F0702030302020204" pitchFamily="66" charset="0"/>
               </a:rPr>
               <a:t> </a:t>
             </a:r>
@@ -3688,6 +3762,7 @@
                 <a:solidFill>
                   <a:srgbClr val="FFFF00"/>
                 </a:solidFill>
+                <a:latin typeface="Comic Sans MS" panose="030F0702030302020204" pitchFamily="66" charset="0"/>
               </a:rPr>
               <a:t>time</a:t>
             </a:r>
@@ -3696,6 +3771,7 @@
                 <a:solidFill>
                   <a:srgbClr val="FFFF00"/>
                 </a:solidFill>
+                <a:latin typeface="Comic Sans MS" panose="030F0702030302020204" pitchFamily="66" charset="0"/>
               </a:rPr>
               <a:t> in video </a:t>
             </a:r>
@@ -3704,6 +3780,7 @@
                 <a:solidFill>
                   <a:srgbClr val="FFFF00"/>
                 </a:solidFill>
+                <a:latin typeface="Comic Sans MS" panose="030F0702030302020204" pitchFamily="66" charset="0"/>
               </a:rPr>
               <a:t>game</a:t>
             </a:r>
@@ -3712,6 +3789,7 @@
                 <a:solidFill>
                   <a:srgbClr val="FFFF00"/>
                 </a:solidFill>
+                <a:latin typeface="Comic Sans MS" panose="030F0702030302020204" pitchFamily="66" charset="0"/>
               </a:rPr>
               <a:t> </a:t>
             </a:r>
@@ -3720,6 +3798,7 @@
                 <a:solidFill>
                   <a:srgbClr val="FFFF00"/>
                 </a:solidFill>
+                <a:latin typeface="Comic Sans MS" panose="030F0702030302020204" pitchFamily="66" charset="0"/>
               </a:rPr>
               <a:t>history</a:t>
             </a:r>
@@ -3728,6 +3807,7 @@
                 <a:solidFill>
                   <a:srgbClr val="FFFF00"/>
                 </a:solidFill>
+                <a:latin typeface="Comic Sans MS" panose="030F0702030302020204" pitchFamily="66" charset="0"/>
               </a:rPr>
               <a:t>: </a:t>
             </a:r>
@@ -3736,6 +3816,7 @@
                 <a:solidFill>
                   <a:srgbClr val="FFFF00"/>
                 </a:solidFill>
+                <a:latin typeface="Comic Sans MS" panose="030F0702030302020204" pitchFamily="66" charset="0"/>
               </a:rPr>
               <a:t>controllable</a:t>
             </a:r>
@@ -3744,6 +3825,7 @@
                 <a:solidFill>
                   <a:srgbClr val="FFFF00"/>
                 </a:solidFill>
+                <a:latin typeface="Comic Sans MS" panose="030F0702030302020204" pitchFamily="66" charset="0"/>
               </a:rPr>
               <a:t> </a:t>
             </a:r>
@@ -3752,6 +3834,7 @@
                 <a:solidFill>
                   <a:srgbClr val="FFFF00"/>
                 </a:solidFill>
+                <a:latin typeface="Comic Sans MS" panose="030F0702030302020204" pitchFamily="66" charset="0"/>
               </a:rPr>
               <a:t>phallic</a:t>
             </a:r>
@@ -3760,6 +3843,7 @@
                 <a:solidFill>
                   <a:srgbClr val="FFFF00"/>
                 </a:solidFill>
+                <a:latin typeface="Comic Sans MS" panose="030F0702030302020204" pitchFamily="66" charset="0"/>
               </a:rPr>
               <a:t> </a:t>
             </a:r>
@@ -3768,6 +3852,7 @@
                 <a:solidFill>
                   <a:srgbClr val="FFFF00"/>
                 </a:solidFill>
+                <a:latin typeface="Comic Sans MS" panose="030F0702030302020204" pitchFamily="66" charset="0"/>
               </a:rPr>
               <a:t>space</a:t>
             </a:r>
@@ -3776,6 +3861,7 @@
                 <a:solidFill>
                   <a:srgbClr val="FFFF00"/>
                 </a:solidFill>
+                <a:latin typeface="Comic Sans MS" panose="030F0702030302020204" pitchFamily="66" charset="0"/>
               </a:rPr>
               <a:t> </a:t>
             </a:r>
@@ -3784,6 +3870,7 @@
                 <a:solidFill>
                   <a:srgbClr val="FFFF00"/>
                 </a:solidFill>
+                <a:latin typeface="Comic Sans MS" panose="030F0702030302020204" pitchFamily="66" charset="0"/>
               </a:rPr>
               <a:t>objects</a:t>
             </a:r>
@@ -3791,6 +3878,7 @@
               <a:solidFill>
                 <a:srgbClr val="FFFF00"/>
               </a:solidFill>
+              <a:latin typeface="Comic Sans MS" panose="030F0702030302020204" pitchFamily="66" charset="0"/>
             </a:endParaRPr>
           </a:p>
           <a:p>
@@ -3799,6 +3887,7 @@
                 <a:solidFill>
                   <a:srgbClr val="FFFF00"/>
                 </a:solidFill>
+                <a:latin typeface="Comic Sans MS" panose="030F0702030302020204" pitchFamily="66" charset="0"/>
               </a:rPr>
               <a:t>”GOTY of 2016” – </a:t>
             </a:r>
@@ -3807,6 +3896,7 @@
                 <a:solidFill>
                   <a:srgbClr val="FFFF00"/>
                 </a:solidFill>
+                <a:latin typeface="Comic Sans MS" panose="030F0702030302020204" pitchFamily="66" charset="0"/>
               </a:rPr>
               <a:t>paid</a:t>
             </a:r>
@@ -3815,6 +3905,7 @@
                 <a:solidFill>
                   <a:srgbClr val="FFFF00"/>
                 </a:solidFill>
+                <a:latin typeface="Comic Sans MS" panose="030F0702030302020204" pitchFamily="66" charset="0"/>
               </a:rPr>
               <a:t> </a:t>
             </a:r>
@@ -3823,6 +3914,7 @@
                 <a:solidFill>
                   <a:srgbClr val="FFFF00"/>
                 </a:solidFill>
+                <a:latin typeface="Comic Sans MS" panose="030F0702030302020204" pitchFamily="66" charset="0"/>
               </a:rPr>
               <a:t>reviewer</a:t>
             </a:r>
@@ -3830,6 +3922,7 @@
               <a:solidFill>
                 <a:srgbClr val="FFFF00"/>
               </a:solidFill>
+              <a:latin typeface="Comic Sans MS" panose="030F0702030302020204" pitchFamily="66" charset="0"/>
             </a:endParaRPr>
           </a:p>
           <a:p>
@@ -3838,6 +3931,7 @@
                 <a:solidFill>
                   <a:srgbClr val="FFFF00"/>
                 </a:solidFill>
+                <a:latin typeface="Comic Sans MS" panose="030F0702030302020204" pitchFamily="66" charset="0"/>
               </a:rPr>
               <a:t>”It just </a:t>
             </a:r>
@@ -3846,6 +3940,7 @@
                 <a:solidFill>
                   <a:srgbClr val="FFFF00"/>
                 </a:solidFill>
+                <a:latin typeface="Comic Sans MS" panose="030F0702030302020204" pitchFamily="66" charset="0"/>
               </a:rPr>
               <a:t>werks</a:t>
             </a:r>
@@ -3854,6 +3949,7 @@
                 <a:solidFill>
                   <a:srgbClr val="FFFF00"/>
                 </a:solidFill>
+                <a:latin typeface="Comic Sans MS" panose="030F0702030302020204" pitchFamily="66" charset="0"/>
               </a:rPr>
               <a:t>” – </a:t>
             </a:r>
@@ -3862,6 +3958,7 @@
                 <a:solidFill>
                   <a:srgbClr val="FFFF00"/>
                 </a:solidFill>
+                <a:latin typeface="Comic Sans MS" panose="030F0702030302020204" pitchFamily="66" charset="0"/>
               </a:rPr>
               <a:t>Hodd</a:t>
             </a:r>
@@ -3870,6 +3967,7 @@
                 <a:solidFill>
                   <a:srgbClr val="FFFF00"/>
                 </a:solidFill>
+                <a:latin typeface="Comic Sans MS" panose="030F0702030302020204" pitchFamily="66" charset="0"/>
               </a:rPr>
               <a:t> </a:t>
             </a:r>
@@ -3878,6 +3976,7 @@
                 <a:solidFill>
                   <a:srgbClr val="FFFF00"/>
                 </a:solidFill>
+                <a:latin typeface="Comic Sans MS" panose="030F0702030302020204" pitchFamily="66" charset="0"/>
               </a:rPr>
               <a:t>Toward</a:t>
             </a:r>
@@ -3885,6 +3984,7 @@
               <a:solidFill>
                 <a:srgbClr val="FFFF00"/>
               </a:solidFill>
+              <a:latin typeface="Comic Sans MS" panose="030F0702030302020204" pitchFamily="66" charset="0"/>
             </a:endParaRPr>
           </a:p>
           <a:p>
@@ -3893,6 +3993,7 @@
                 <a:solidFill>
                   <a:srgbClr val="FFFF00"/>
                 </a:solidFill>
+                <a:latin typeface="Comic Sans MS" panose="030F0702030302020204" pitchFamily="66" charset="0"/>
               </a:rPr>
               <a:t>”</a:t>
             </a:r>
@@ -3901,6 +4002,7 @@
                 <a:solidFill>
                   <a:srgbClr val="FFFF00"/>
                 </a:solidFill>
+                <a:latin typeface="Comic Sans MS" panose="030F0702030302020204" pitchFamily="66" charset="0"/>
               </a:rPr>
               <a:t>Straight</a:t>
             </a:r>
@@ -3909,6 +4011,7 @@
                 <a:solidFill>
                   <a:srgbClr val="FFFF00"/>
                 </a:solidFill>
+                <a:latin typeface="Comic Sans MS" panose="030F0702030302020204" pitchFamily="66" charset="0"/>
               </a:rPr>
               <a:t> to </a:t>
             </a:r>
@@ -3917,6 +4020,7 @@
                 <a:solidFill>
                   <a:srgbClr val="FFFF00"/>
                 </a:solidFill>
+                <a:latin typeface="Comic Sans MS" panose="030F0702030302020204" pitchFamily="66" charset="0"/>
               </a:rPr>
               <a:t>greenlight</a:t>
             </a:r>
@@ -3925,6 +4029,7 @@
                 <a:solidFill>
                   <a:srgbClr val="FFFF00"/>
                 </a:solidFill>
+                <a:latin typeface="Comic Sans MS" panose="030F0702030302020204" pitchFamily="66" charset="0"/>
               </a:rPr>
               <a:t> </a:t>
             </a:r>
@@ -3933,6 +4038,7 @@
                 <a:solidFill>
                   <a:srgbClr val="FFFF00"/>
                 </a:solidFill>
+                <a:latin typeface="Comic Sans MS" panose="030F0702030302020204" pitchFamily="66" charset="0"/>
               </a:rPr>
               <a:t>pls</a:t>
             </a:r>
@@ -3941,14 +4047,16 @@
                 <a:solidFill>
                   <a:srgbClr val="FFFF00"/>
                 </a:solidFill>
+                <a:latin typeface="Comic Sans MS" panose="030F0702030302020204" pitchFamily="66" charset="0"/>
               </a:rPr>
               <a:t>” - </a:t>
             </a:r>
             <a:r>
-              <a:rPr lang="fi-FI" smtClean="0">
-                <a:solidFill>
-                  <a:srgbClr val="FFFF00"/>
-                </a:solidFill>
+              <a:rPr lang="fi-FI" dirty="0" err="1" smtClean="0">
+                <a:solidFill>
+                  <a:srgbClr val="FFFF00"/>
+                </a:solidFill>
+                <a:latin typeface="Comic Sans MS" panose="030F0702030302020204" pitchFamily="66" charset="0"/>
               </a:rPr>
               <a:t>GaybeN</a:t>
             </a:r>
@@ -3956,6 +4064,7 @@
               <a:solidFill>
                 <a:srgbClr val="FFFF00"/>
               </a:solidFill>
+              <a:latin typeface="Comic Sans MS" panose="030F0702030302020204" pitchFamily="66" charset="0"/>
             </a:endParaRPr>
           </a:p>
         </p:txBody>
@@ -3999,6 +4108,66 @@
               </a14:hiddenFill>
             </a:ext>
           </a:extLst>
+        </p:spPr>
+      </p:pic>
+      <p:pic>
+        <p:nvPicPr>
+          <p:cNvPr id="8" name="Picture 7"/>
+          <p:cNvPicPr>
+            <a:picLocks noChangeAspect="1"/>
+          </p:cNvPicPr>
+          <p:nvPr/>
+        </p:nvPicPr>
+        <p:blipFill>
+          <a:blip r:embed="rId4">
+            <a:extLst>
+              <a:ext uri="{28A0092B-C50C-407E-A947-70E740481C1C}">
+                <a14:useLocalDpi xmlns:a14="http://schemas.microsoft.com/office/drawing/2010/main" val="0"/>
+              </a:ext>
+            </a:extLst>
+          </a:blip>
+          <a:stretch>
+            <a:fillRect/>
+          </a:stretch>
+        </p:blipFill>
+        <p:spPr>
+          <a:xfrm>
+            <a:off x="273718" y="365125"/>
+            <a:ext cx="1128963" cy="1128963"/>
+          </a:xfrm>
+          <a:prstGeom prst="rect">
+            <a:avLst/>
+          </a:prstGeom>
+        </p:spPr>
+      </p:pic>
+      <p:pic>
+        <p:nvPicPr>
+          <p:cNvPr id="10" name="Picture 9"/>
+          <p:cNvPicPr>
+            <a:picLocks noChangeAspect="1"/>
+          </p:cNvPicPr>
+          <p:nvPr/>
+        </p:nvPicPr>
+        <p:blipFill>
+          <a:blip r:embed="rId4">
+            <a:extLst>
+              <a:ext uri="{28A0092B-C50C-407E-A947-70E740481C1C}">
+                <a14:useLocalDpi xmlns:a14="http://schemas.microsoft.com/office/drawing/2010/main" val="0"/>
+              </a:ext>
+            </a:extLst>
+          </a:blip>
+          <a:stretch>
+            <a:fillRect/>
+          </a:stretch>
+        </p:blipFill>
+        <p:spPr>
+          <a:xfrm>
+            <a:off x="10788315" y="363119"/>
+            <a:ext cx="1130969" cy="1130969"/>
+          </a:xfrm>
+          <a:prstGeom prst="rect">
+            <a:avLst/>
+          </a:prstGeom>
         </p:spPr>
       </p:pic>
     </p:spTree>

</xml_diff>